<commit_message>
Finished poster (minus case study section graphs)
</commit_message>
<xml_diff>
--- a/Documents/G7-a0_landscape-projectposter-Daniel.pptx
+++ b/Documents/G7-a0_landscape-projectposter-Daniel.pptx
@@ -5740,7 +5740,7 @@
         </p:nvSpPr>
         <p:spPr>
           <a:xfrm>
-            <a:off x="15265321" y="26258190"/>
+            <a:off x="15264720" y="25661525"/>
             <a:ext cx="12273120" cy="1093680"/>
           </a:xfrm>
           <a:prstGeom prst="rect">
@@ -5952,7 +5952,7 @@
         </p:nvSpPr>
         <p:spPr>
           <a:xfrm>
-            <a:off x="15265321" y="26258190"/>
+            <a:off x="15264720" y="25661525"/>
             <a:ext cx="12273120" cy="920400"/>
           </a:xfrm>
           <a:prstGeom prst="rect">
@@ -6011,7 +6011,7 @@
         </p:nvSpPr>
         <p:spPr>
           <a:xfrm>
-            <a:off x="18277681" y="26395224"/>
+            <a:off x="18277080" y="25798559"/>
             <a:ext cx="6248400" cy="646331"/>
           </a:xfrm>
           <a:prstGeom prst="rect">
@@ -6093,7 +6093,7 @@
         </p:blipFill>
         <p:spPr>
           <a:xfrm>
-            <a:off x="15758580" y="14629610"/>
+            <a:off x="15758580" y="14368966"/>
             <a:ext cx="11285400" cy="10995099"/>
           </a:xfrm>
           <a:prstGeom prst="rect">
@@ -6115,8 +6115,8 @@
         </p:nvSpPr>
         <p:spPr>
           <a:xfrm>
-            <a:off x="15264720" y="27536172"/>
-            <a:ext cx="12273120" cy="2785378"/>
+            <a:off x="15265321" y="26865810"/>
+            <a:ext cx="12273120" cy="3272691"/>
           </a:xfrm>
           <a:prstGeom prst="rect">
             <a:avLst/>
@@ -6275,10 +6275,48 @@
               <a:buFont typeface="Arial" panose="020B0604020202020204" pitchFamily="34" charset="0"/>
               <a:buNone/>
             </a:pPr>
+            <a:r>
+              <a:rPr lang="en-US" sz="2000" b="1" dirty="0">
+                <a:latin typeface="Times New Roman" panose="02020603050405020304" pitchFamily="18" charset="0"/>
+                <a:cs typeface="Times New Roman" panose="02020603050405020304" pitchFamily="18" charset="0"/>
+              </a:rPr>
+              <a:t>[4]</a:t>
+            </a:r>
+            <a:r>
+              <a:rPr lang="en-US" sz="2000" dirty="0">
+                <a:latin typeface="Times New Roman" panose="02020603050405020304" pitchFamily="18" charset="0"/>
+                <a:cs typeface="Times New Roman" panose="02020603050405020304" pitchFamily="18" charset="0"/>
+              </a:rPr>
+              <a:t> "Raspberry Pi 4 Model B," Raspberry Pi, </a:t>
+            </a:r>
+            <a:r>
+              <a:rPr lang="en-US" sz="2000" dirty="0">
+                <a:latin typeface="Times New Roman" panose="02020603050405020304" pitchFamily="18" charset="0"/>
+                <a:cs typeface="Times New Roman" panose="02020603050405020304" pitchFamily="18" charset="0"/>
+                <a:hlinkClick r:id="rId4">
+                  <a:extLst>
+                    <a:ext uri="{A12FA001-AC4F-418D-AE19-62706E023703}">
+                      <ahyp:hlinkClr xmlns:ahyp="http://schemas.microsoft.com/office/drawing/2018/hyperlinkcolor" val="tx"/>
+                    </a:ext>
+                  </a:extLst>
+                </a:hlinkClick>
+              </a:rPr>
+              <a:t>https://www.raspberrypi.com/products/raspberry-pi-4-model-b/</a:t>
+            </a:r>
+            <a:endParaRPr lang="en-GB" sz="2000" dirty="0">
+              <a:latin typeface="Times New Roman" panose="02020603050405020304" pitchFamily="18" charset="0"/>
+              <a:cs typeface="Times New Roman" panose="02020603050405020304" pitchFamily="18" charset="0"/>
+            </a:endParaRPr>
+          </a:p>
+          <a:p>
+            <a:pPr indent="0" algn="just">
+              <a:spcBef>
+                <a:spcPts val="1417"/>
+              </a:spcBef>
+              <a:buFont typeface="Arial" panose="020B0604020202020204" pitchFamily="34" charset="0"/>
+              <a:buNone/>
+            </a:pPr>
             <a:endParaRPr lang="en-CA" sz="2000" spc="-1" dirty="0">
-              <a:solidFill>
-                <a:srgbClr val="000000"/>
-              </a:solidFill>
               <a:latin typeface="Times New Roman" panose="02020603050405020304" pitchFamily="18" charset="0"/>
               <a:cs typeface="Times New Roman" panose="02020603050405020304" pitchFamily="18" charset="0"/>
             </a:endParaRPr>
@@ -6300,7 +6338,7 @@
           <p:nvPr/>
         </p:nvPicPr>
         <p:blipFill>
-          <a:blip r:embed="rId4"/>
+          <a:blip r:embed="rId5"/>
           <a:stretch>
             <a:fillRect/>
           </a:stretch>
@@ -6475,7 +6513,7 @@
           <p:nvPr/>
         </p:nvPicPr>
         <p:blipFill>
-          <a:blip r:embed="rId5"/>
+          <a:blip r:embed="rId6"/>
           <a:stretch>
             <a:fillRect/>
           </a:stretch>
@@ -6769,6 +6807,16 @@
               <a:defRPr/>
             </a:pPr>
             <a:r>
+              <a:rPr lang="en-GB" sz="2400" u="sng" spc="-1" dirty="0">
+                <a:solidFill>
+                  <a:srgbClr val="000000"/>
+                </a:solidFill>
+                <a:latin typeface="Times New Roman" panose="02020603050405020304" pitchFamily="18" charset="0"/>
+                <a:cs typeface="Times New Roman" panose="02020603050405020304" pitchFamily="18" charset="0"/>
+              </a:rPr>
+              <a:t>Apache HTTP Server:</a:t>
+            </a:r>
+            <a:r>
               <a:rPr lang="en-GB" sz="2400" spc="-1" dirty="0">
                 <a:solidFill>
                   <a:srgbClr val="000000"/>
@@ -6776,7 +6824,7 @@
                 <a:latin typeface="Times New Roman" panose="02020603050405020304" pitchFamily="18" charset="0"/>
                 <a:cs typeface="Times New Roman" panose="02020603050405020304" pitchFamily="18" charset="0"/>
               </a:rPr>
-              <a:t>Leverage watchdog timers; system hang detection and recovery</a:t>
+              <a:t> Web content hosting and caching tools</a:t>
             </a:r>
           </a:p>
           <a:p>
@@ -6787,6 +6835,16 @@
               <a:defRPr/>
             </a:pPr>
             <a:r>
+              <a:rPr lang="en-GB" sz="2400" u="sng" spc="-1" dirty="0">
+                <a:solidFill>
+                  <a:srgbClr val="000000"/>
+                </a:solidFill>
+                <a:latin typeface="Times New Roman" panose="02020603050405020304" pitchFamily="18" charset="0"/>
+                <a:cs typeface="Times New Roman" panose="02020603050405020304" pitchFamily="18" charset="0"/>
+              </a:rPr>
+              <a:t>JMeter:</a:t>
+            </a:r>
+            <a:r>
               <a:rPr lang="en-GB" sz="2400" spc="-1" dirty="0">
                 <a:solidFill>
                   <a:srgbClr val="000000"/>
@@ -6794,36 +6852,26 @@
                 <a:latin typeface="Times New Roman" panose="02020603050405020304" pitchFamily="18" charset="0"/>
                 <a:cs typeface="Times New Roman" panose="02020603050405020304" pitchFamily="18" charset="0"/>
               </a:rPr>
-              <a:t>Voltage, CPU Temp, CPU Clock, Latency, CPU Usage, Memory Usage</a:t>
-            </a:r>
-          </a:p>
-          <a:p>
-            <a:pPr indent="0">
+              <a:t> User traffic simulation; varying traffic and bandwidth conditions</a:t>
+            </a:r>
+          </a:p>
+          <a:p>
+            <a:pPr marL="685800" indent="-457200">
               <a:spcBef>
                 <a:spcPts val="1417"/>
               </a:spcBef>
-              <a:buFont typeface="Arial" panose="020B0604020202020204" pitchFamily="34" charset="0"/>
-              <a:buNone/>
               <a:defRPr/>
             </a:pPr>
             <a:r>
-              <a:rPr lang="en-US" sz="3200" b="1" dirty="0">
+              <a:rPr lang="en-GB" sz="2400" u="sng" spc="-1" dirty="0">
                 <a:solidFill>
                   <a:srgbClr val="000000"/>
                 </a:solidFill>
                 <a:latin typeface="Times New Roman" panose="02020603050405020304" pitchFamily="18" charset="0"/>
                 <a:cs typeface="Times New Roman" panose="02020603050405020304" pitchFamily="18" charset="0"/>
               </a:rPr>
-              <a:t>Testing and Validation</a:t>
-            </a:r>
-          </a:p>
-          <a:p>
-            <a:pPr marL="685800" indent="-457200">
-              <a:spcBef>
-                <a:spcPts val="1417"/>
-              </a:spcBef>
-              <a:defRPr/>
-            </a:pPr>
+              <a:t>Python:</a:t>
+            </a:r>
             <a:r>
               <a:rPr lang="en-GB" sz="2400" spc="-1" dirty="0">
                 <a:solidFill>
@@ -6832,35 +6880,9 @@
                 <a:latin typeface="Times New Roman" panose="02020603050405020304" pitchFamily="18" charset="0"/>
                 <a:cs typeface="Times New Roman" panose="02020603050405020304" pitchFamily="18" charset="0"/>
               </a:rPr>
-              <a:t>Leverage watchdog timers; system hang detection and recovery</a:t>
-            </a:r>
-          </a:p>
-          <a:p>
-            <a:pPr marL="685800" indent="-457200">
-              <a:spcBef>
-                <a:spcPts val="1417"/>
-              </a:spcBef>
-              <a:defRPr/>
-            </a:pPr>
-            <a:r>
-              <a:rPr lang="en-GB" sz="2400" spc="-1" dirty="0">
-                <a:solidFill>
-                  <a:srgbClr val="000000"/>
-                </a:solidFill>
-                <a:latin typeface="Times New Roman" panose="02020603050405020304" pitchFamily="18" charset="0"/>
-                <a:cs typeface="Times New Roman" panose="02020603050405020304" pitchFamily="18" charset="0"/>
-              </a:rPr>
-              <a:t>Voltage, CPU Temp, CPU Clock, Latency, CPU Usage, Memory Usage</a:t>
-            </a:r>
-          </a:p>
-          <a:p>
-            <a:pPr marL="685800" indent="-457200">
-              <a:spcBef>
-                <a:spcPts val="1417"/>
-              </a:spcBef>
-              <a:defRPr/>
-            </a:pPr>
-            <a:endParaRPr lang="en-GB" sz="2400" spc="-1" dirty="0">
+              <a:t> Daemon for resource monitoring and adaptation execution</a:t>
+            </a:r>
+            <a:endParaRPr lang="en-GB" sz="2400" u="sng" spc="-1" dirty="0">
               <a:solidFill>
                 <a:srgbClr val="000000"/>
               </a:solidFill>
@@ -6868,8 +6890,429 @@
               <a:cs typeface="Times New Roman" panose="02020603050405020304" pitchFamily="18" charset="0"/>
             </a:endParaRPr>
           </a:p>
-        </p:txBody>
-      </p:sp>
+          <a:p>
+            <a:pPr indent="0">
+              <a:spcBef>
+                <a:spcPts val="1417"/>
+              </a:spcBef>
+              <a:buFont typeface="Arial" panose="020B0604020202020204" pitchFamily="34" charset="0"/>
+              <a:buNone/>
+              <a:defRPr/>
+            </a:pPr>
+            <a:r>
+              <a:rPr lang="en-US" sz="3200" b="1" dirty="0">
+                <a:solidFill>
+                  <a:srgbClr val="000000"/>
+                </a:solidFill>
+                <a:latin typeface="Times New Roman" panose="02020603050405020304" pitchFamily="18" charset="0"/>
+                <a:cs typeface="Times New Roman" panose="02020603050405020304" pitchFamily="18" charset="0"/>
+              </a:rPr>
+              <a:t>Testing</a:t>
+            </a:r>
+          </a:p>
+          <a:p>
+            <a:pPr marL="685800" indent="-457200">
+              <a:spcBef>
+                <a:spcPts val="1417"/>
+              </a:spcBef>
+              <a:defRPr/>
+            </a:pPr>
+            <a:r>
+              <a:rPr lang="en-GB" sz="2400" spc="-1" dirty="0">
+                <a:solidFill>
+                  <a:srgbClr val="000000"/>
+                </a:solidFill>
+                <a:latin typeface="Times New Roman" panose="02020603050405020304" pitchFamily="18" charset="0"/>
+                <a:cs typeface="Times New Roman" panose="02020603050405020304" pitchFamily="18" charset="0"/>
+              </a:rPr>
+              <a:t>Traffic stress testing; simulating real-world scenarios</a:t>
+            </a:r>
+          </a:p>
+          <a:p>
+            <a:pPr marL="685800" indent="-457200">
+              <a:spcBef>
+                <a:spcPts val="1417"/>
+              </a:spcBef>
+              <a:defRPr/>
+            </a:pPr>
+            <a:r>
+              <a:rPr lang="en-GB" sz="2400" spc="-1" dirty="0">
+                <a:solidFill>
+                  <a:srgbClr val="000000"/>
+                </a:solidFill>
+                <a:latin typeface="Times New Roman" panose="02020603050405020304" pitchFamily="18" charset="0"/>
+                <a:cs typeface="Times New Roman" panose="02020603050405020304" pitchFamily="18" charset="0"/>
+              </a:rPr>
+              <a:t>Historical data collection</a:t>
+            </a:r>
+          </a:p>
+        </p:txBody>
+      </p:sp>
+      <p:sp>
+        <p:nvSpPr>
+          <p:cNvPr id="29" name="TextBox 28">
+            <a:extLst>
+              <a:ext uri="{FF2B5EF4-FFF2-40B4-BE49-F238E27FC236}">
+                <a16:creationId xmlns:a16="http://schemas.microsoft.com/office/drawing/2014/main" id="{B42BAD57-6ED7-23A5-8976-B3308539978D}"/>
+              </a:ext>
+            </a:extLst>
+          </p:cNvPr>
+          <p:cNvSpPr txBox="1"/>
+          <p:nvPr/>
+        </p:nvSpPr>
+        <p:spPr>
+          <a:xfrm>
+            <a:off x="29029680" y="22003200"/>
+            <a:ext cx="12273120" cy="5622052"/>
+          </a:xfrm>
+          <a:prstGeom prst="rect">
+            <a:avLst/>
+          </a:prstGeom>
+          <a:noFill/>
+        </p:spPr>
+        <p:txBody>
+          <a:bodyPr wrap="square" rtlCol="0">
+            <a:spAutoFit/>
+          </a:bodyPr>
+          <a:lstStyle/>
+          <a:p>
+            <a:pPr marL="0" marR="0" lvl="0" indent="0" algn="l" defTabSz="914400" rtl="0" eaLnBrk="1" fontAlgn="auto" latinLnBrk="0" hangingPunct="1">
+              <a:lnSpc>
+                <a:spcPct val="100000"/>
+              </a:lnSpc>
+              <a:spcBef>
+                <a:spcPts val="1417"/>
+              </a:spcBef>
+              <a:spcAft>
+                <a:spcPts val="0"/>
+              </a:spcAft>
+              <a:buClrTx/>
+              <a:buSzTx/>
+              <a:buFont typeface="Arial" panose="020B0604020202020204" pitchFamily="34" charset="0"/>
+              <a:buNone/>
+              <a:tabLst/>
+              <a:defRPr/>
+            </a:pPr>
+            <a:r>
+              <a:rPr lang="en-US" sz="3200" b="1" dirty="0">
+                <a:solidFill>
+                  <a:srgbClr val="000000"/>
+                </a:solidFill>
+                <a:latin typeface="Times New Roman" panose="02020603050405020304" pitchFamily="18" charset="0"/>
+                <a:cs typeface="Times New Roman" panose="02020603050405020304" pitchFamily="18" charset="0"/>
+              </a:rPr>
+              <a:t>Outcome</a:t>
+            </a:r>
+          </a:p>
+          <a:p>
+            <a:pPr marL="342900" marR="0" lvl="0" indent="-342900" algn="l" defTabSz="914400" rtl="0" eaLnBrk="1" fontAlgn="auto" latinLnBrk="0" hangingPunct="1">
+              <a:lnSpc>
+                <a:spcPct val="100000"/>
+              </a:lnSpc>
+              <a:spcBef>
+                <a:spcPts val="1417"/>
+              </a:spcBef>
+              <a:spcAft>
+                <a:spcPts val="0"/>
+              </a:spcAft>
+              <a:buClrTx/>
+              <a:buSzTx/>
+              <a:buFont typeface="Arial" panose="020B0604020202020204" pitchFamily="34" charset="0"/>
+              <a:buChar char="•"/>
+              <a:tabLst/>
+              <a:defRPr/>
+            </a:pPr>
+            <a:r>
+              <a:rPr lang="en-US" sz="2400" spc="-1" dirty="0">
+                <a:solidFill>
+                  <a:srgbClr val="000000"/>
+                </a:solidFill>
+                <a:latin typeface="Times New Roman" panose="02020603050405020304" pitchFamily="18" charset="0"/>
+                <a:cs typeface="Times New Roman" panose="02020603050405020304" pitchFamily="18" charset="0"/>
+              </a:rPr>
+              <a:t>Adaptive framework improves </a:t>
+            </a:r>
+            <a:r>
+              <a:rPr lang="en-US" sz="2400" spc="-1" dirty="0" err="1">
+                <a:solidFill>
+                  <a:srgbClr val="000000"/>
+                </a:solidFill>
+                <a:latin typeface="Times New Roman" panose="02020603050405020304" pitchFamily="18" charset="0"/>
+                <a:cs typeface="Times New Roman" panose="02020603050405020304" pitchFamily="18" charset="0"/>
+              </a:rPr>
+              <a:t>RPiWeb</a:t>
+            </a:r>
+            <a:r>
+              <a:rPr lang="en-US" sz="2400" spc="-1" dirty="0">
+                <a:solidFill>
+                  <a:srgbClr val="000000"/>
+                </a:solidFill>
+                <a:latin typeface="Times New Roman" panose="02020603050405020304" pitchFamily="18" charset="0"/>
+                <a:cs typeface="Times New Roman" panose="02020603050405020304" pitchFamily="18" charset="0"/>
+              </a:rPr>
+              <a:t> hosting</a:t>
+            </a:r>
+          </a:p>
+          <a:p>
+            <a:pPr marL="0" marR="0" lvl="0" indent="0" algn="l" defTabSz="914400" rtl="0" eaLnBrk="1" fontAlgn="auto" latinLnBrk="0" hangingPunct="1">
+              <a:lnSpc>
+                <a:spcPct val="100000"/>
+              </a:lnSpc>
+              <a:spcBef>
+                <a:spcPts val="1417"/>
+              </a:spcBef>
+              <a:spcAft>
+                <a:spcPts val="0"/>
+              </a:spcAft>
+              <a:buClrTx/>
+              <a:buSzTx/>
+              <a:buFont typeface="Arial" panose="020B0604020202020204" pitchFamily="34" charset="0"/>
+              <a:buNone/>
+              <a:tabLst/>
+              <a:defRPr/>
+            </a:pPr>
+            <a:endParaRPr lang="en-US" sz="3200" b="1" dirty="0">
+              <a:solidFill>
+                <a:srgbClr val="000000"/>
+              </a:solidFill>
+              <a:latin typeface="Times New Roman" panose="02020603050405020304" pitchFamily="18" charset="0"/>
+              <a:cs typeface="Times New Roman" panose="02020603050405020304" pitchFamily="18" charset="0"/>
+            </a:endParaRPr>
+          </a:p>
+          <a:p>
+            <a:pPr marL="0" marR="0" lvl="0" indent="0" algn="l" defTabSz="914400" rtl="0" eaLnBrk="1" fontAlgn="auto" latinLnBrk="0" hangingPunct="1">
+              <a:lnSpc>
+                <a:spcPct val="100000"/>
+              </a:lnSpc>
+              <a:spcBef>
+                <a:spcPts val="1417"/>
+              </a:spcBef>
+              <a:spcAft>
+                <a:spcPts val="0"/>
+              </a:spcAft>
+              <a:buClrTx/>
+              <a:buSzTx/>
+              <a:buFont typeface="Arial" panose="020B0604020202020204" pitchFamily="34" charset="0"/>
+              <a:buNone/>
+              <a:tabLst/>
+              <a:defRPr/>
+            </a:pPr>
+            <a:endParaRPr lang="en-US" sz="3200" b="1" dirty="0">
+              <a:solidFill>
+                <a:srgbClr val="000000"/>
+              </a:solidFill>
+              <a:latin typeface="Times New Roman" panose="02020603050405020304" pitchFamily="18" charset="0"/>
+              <a:cs typeface="Times New Roman" panose="02020603050405020304" pitchFamily="18" charset="0"/>
+            </a:endParaRPr>
+          </a:p>
+          <a:p>
+            <a:pPr marL="0" marR="0" lvl="0" indent="0" algn="l" defTabSz="914400" rtl="0" eaLnBrk="1" fontAlgn="auto" latinLnBrk="0" hangingPunct="1">
+              <a:lnSpc>
+                <a:spcPct val="100000"/>
+              </a:lnSpc>
+              <a:spcBef>
+                <a:spcPts val="1417"/>
+              </a:spcBef>
+              <a:spcAft>
+                <a:spcPts val="0"/>
+              </a:spcAft>
+              <a:buClrTx/>
+              <a:buSzTx/>
+              <a:buFont typeface="Arial" panose="020B0604020202020204" pitchFamily="34" charset="0"/>
+              <a:buNone/>
+              <a:tabLst/>
+              <a:defRPr/>
+            </a:pPr>
+            <a:r>
+              <a:rPr lang="en-US" sz="3200" b="1" dirty="0">
+                <a:solidFill>
+                  <a:srgbClr val="000000"/>
+                </a:solidFill>
+                <a:latin typeface="Times New Roman" panose="02020603050405020304" pitchFamily="18" charset="0"/>
+                <a:cs typeface="Times New Roman" panose="02020603050405020304" pitchFamily="18" charset="0"/>
+              </a:rPr>
+              <a:t>Considerations</a:t>
+            </a:r>
+          </a:p>
+          <a:p>
+            <a:pPr marL="342900" marR="0" lvl="0" indent="-342900" algn="l" defTabSz="914400" rtl="0" eaLnBrk="1" fontAlgn="auto" latinLnBrk="0" hangingPunct="1">
+              <a:lnSpc>
+                <a:spcPct val="100000"/>
+              </a:lnSpc>
+              <a:spcBef>
+                <a:spcPts val="1417"/>
+              </a:spcBef>
+              <a:spcAft>
+                <a:spcPts val="0"/>
+              </a:spcAft>
+              <a:buClrTx/>
+              <a:buSzTx/>
+              <a:buFont typeface="Arial" panose="020B0604020202020204" pitchFamily="34" charset="0"/>
+              <a:buChar char="•"/>
+              <a:tabLst/>
+              <a:defRPr/>
+            </a:pPr>
+            <a:r>
+              <a:rPr lang="en-US" sz="2400" spc="-1" dirty="0">
+                <a:solidFill>
+                  <a:srgbClr val="000000"/>
+                </a:solidFill>
+                <a:latin typeface="Times New Roman" panose="02020603050405020304" pitchFamily="18" charset="0"/>
+                <a:cs typeface="Times New Roman" panose="02020603050405020304" pitchFamily="18" charset="0"/>
+              </a:rPr>
+              <a:t>ML improvements with richer historical data for model training</a:t>
+            </a:r>
+          </a:p>
+          <a:p>
+            <a:pPr marL="342900" marR="0" lvl="0" indent="-342900" algn="l" defTabSz="914400" rtl="0" eaLnBrk="1" fontAlgn="auto" latinLnBrk="0" hangingPunct="1">
+              <a:lnSpc>
+                <a:spcPct val="100000"/>
+              </a:lnSpc>
+              <a:spcBef>
+                <a:spcPts val="1417"/>
+              </a:spcBef>
+              <a:spcAft>
+                <a:spcPts val="0"/>
+              </a:spcAft>
+              <a:buClrTx/>
+              <a:buSzTx/>
+              <a:buFont typeface="Arial" panose="020B0604020202020204" pitchFamily="34" charset="0"/>
+              <a:buChar char="•"/>
+              <a:tabLst/>
+              <a:defRPr/>
+            </a:pPr>
+            <a:r>
+              <a:rPr lang="en-US" sz="2400" spc="-1" dirty="0">
+                <a:solidFill>
+                  <a:srgbClr val="000000"/>
+                </a:solidFill>
+                <a:latin typeface="Times New Roman" panose="02020603050405020304" pitchFamily="18" charset="0"/>
+                <a:cs typeface="Times New Roman" panose="02020603050405020304" pitchFamily="18" charset="0"/>
+              </a:rPr>
+              <a:t>Framework scalability to even more resource constrained environments</a:t>
+            </a:r>
+          </a:p>
+          <a:p>
+            <a:pPr marR="0" lvl="0" algn="l" defTabSz="914400" rtl="0" eaLnBrk="1" fontAlgn="auto" latinLnBrk="0" hangingPunct="1">
+              <a:lnSpc>
+                <a:spcPct val="100000"/>
+              </a:lnSpc>
+              <a:spcBef>
+                <a:spcPts val="1417"/>
+              </a:spcBef>
+              <a:spcAft>
+                <a:spcPts val="0"/>
+              </a:spcAft>
+              <a:buClrTx/>
+              <a:buSzTx/>
+              <a:tabLst/>
+              <a:defRPr/>
+            </a:pPr>
+            <a:endParaRPr lang="en-US" sz="2400" spc="-1" dirty="0">
+              <a:solidFill>
+                <a:srgbClr val="000000"/>
+              </a:solidFill>
+              <a:latin typeface="Times New Roman" panose="02020603050405020304" pitchFamily="18" charset="0"/>
+              <a:cs typeface="Times New Roman" panose="02020603050405020304" pitchFamily="18" charset="0"/>
+            </a:endParaRPr>
+          </a:p>
+          <a:p>
+            <a:pPr marL="342900" marR="0" lvl="0" indent="-342900" algn="l" defTabSz="914400" rtl="0" eaLnBrk="1" fontAlgn="auto" latinLnBrk="0" hangingPunct="1">
+              <a:lnSpc>
+                <a:spcPct val="100000"/>
+              </a:lnSpc>
+              <a:spcBef>
+                <a:spcPts val="1417"/>
+              </a:spcBef>
+              <a:spcAft>
+                <a:spcPts val="0"/>
+              </a:spcAft>
+              <a:buClrTx/>
+              <a:buSzTx/>
+              <a:buFont typeface="Arial" panose="020B0604020202020204" pitchFamily="34" charset="0"/>
+              <a:buChar char="•"/>
+              <a:tabLst/>
+              <a:defRPr/>
+            </a:pPr>
+            <a:endParaRPr kumimoji="0" lang="en-GB" sz="2400" i="0" u="none" strike="noStrike" kern="1200" cap="none" spc="-1" normalizeH="0" baseline="0" noProof="0" dirty="0">
+              <a:ln>
+                <a:noFill/>
+              </a:ln>
+              <a:solidFill>
+                <a:srgbClr val="000000"/>
+              </a:solidFill>
+              <a:effectLst/>
+              <a:uLnTx/>
+              <a:uFillTx/>
+              <a:latin typeface="Times New Roman" panose="02020603050405020304" pitchFamily="18" charset="0"/>
+              <a:cs typeface="Times New Roman" panose="02020603050405020304" pitchFamily="18" charset="0"/>
+            </a:endParaRPr>
+          </a:p>
+          <a:p>
+            <a:endParaRPr lang="en-US" dirty="0"/>
+          </a:p>
+        </p:txBody>
+      </p:sp>
+      <p:pic>
+        <p:nvPicPr>
+          <p:cNvPr id="39" name="Picture 38">
+            <a:extLst>
+              <a:ext uri="{FF2B5EF4-FFF2-40B4-BE49-F238E27FC236}">
+                <a16:creationId xmlns:a16="http://schemas.microsoft.com/office/drawing/2014/main" id="{9AF0855A-96C0-A5F9-87DE-B632267F665F}"/>
+              </a:ext>
+            </a:extLst>
+          </p:cNvPr>
+          <p:cNvPicPr>
+            <a:picLocks noChangeAspect="1"/>
+          </p:cNvPicPr>
+          <p:nvPr/>
+        </p:nvPicPr>
+        <p:blipFill>
+          <a:blip r:embed="rId7"/>
+          <a:stretch>
+            <a:fillRect/>
+          </a:stretch>
+        </p:blipFill>
+        <p:spPr>
+          <a:xfrm>
+            <a:off x="7779107" y="9389751"/>
+            <a:ext cx="5710465" cy="3381196"/>
+          </a:xfrm>
+          <a:prstGeom prst="rect">
+            <a:avLst/>
+          </a:prstGeom>
+        </p:spPr>
+      </p:pic>
+      <p:pic>
+        <p:nvPicPr>
+          <p:cNvPr id="43" name="Picture 42">
+            <a:extLst>
+              <a:ext uri="{FF2B5EF4-FFF2-40B4-BE49-F238E27FC236}">
+                <a16:creationId xmlns:a16="http://schemas.microsoft.com/office/drawing/2014/main" id="{78849E4C-8CB9-58F1-8F8E-A79ADA29B72B}"/>
+              </a:ext>
+            </a:extLst>
+          </p:cNvPr>
+          <p:cNvPicPr>
+            <a:picLocks noChangeAspect="1"/>
+          </p:cNvPicPr>
+          <p:nvPr/>
+        </p:nvPicPr>
+        <p:blipFill>
+          <a:blip r:embed="rId8"/>
+          <a:stretch>
+            <a:fillRect/>
+          </a:stretch>
+        </p:blipFill>
+        <p:spPr>
+          <a:xfrm>
+            <a:off x="1500963" y="22156295"/>
+            <a:ext cx="6487430" cy="2429214"/>
+          </a:xfrm>
+          <a:prstGeom prst="rect">
+            <a:avLst/>
+          </a:prstGeom>
+        </p:spPr>
+      </p:pic>
     </p:spTree>
   </p:cSld>
   <p:clrMapOvr>

</xml_diff>

<commit_message>
Final Touches w/ adaptation graph
</commit_message>
<xml_diff>
--- a/Documents/G7-a0_landscape-projectposter-Daniel.pptx
+++ b/Documents/G7-a0_landscape-projectposter-Daniel.pptx
@@ -6925,8 +6925,38 @@
         </p:blipFill>
         <p:spPr>
           <a:xfrm>
-            <a:off x="1455480" y="23217844"/>
-            <a:ext cx="7884135" cy="5299478"/>
+            <a:off x="1455480" y="22898976"/>
+            <a:ext cx="6323627" cy="4250552"/>
+          </a:xfrm>
+          <a:prstGeom prst="rect">
+            <a:avLst/>
+          </a:prstGeom>
+        </p:spPr>
+      </p:pic>
+      <p:pic>
+        <p:nvPicPr>
+          <p:cNvPr id="21" name="Picture 20">
+            <a:extLst>
+              <a:ext uri="{FF2B5EF4-FFF2-40B4-BE49-F238E27FC236}">
+                <a16:creationId xmlns:a16="http://schemas.microsoft.com/office/drawing/2014/main" id="{B797238A-C0F0-7356-2B8C-D3023C2BF6AC}"/>
+              </a:ext>
+            </a:extLst>
+          </p:cNvPr>
+          <p:cNvPicPr>
+            <a:picLocks noChangeAspect="1"/>
+          </p:cNvPicPr>
+          <p:nvPr/>
+        </p:nvPicPr>
+        <p:blipFill>
+          <a:blip r:embed="rId10"/>
+          <a:stretch>
+            <a:fillRect/>
+          </a:stretch>
+        </p:blipFill>
+        <p:spPr>
+          <a:xfrm>
+            <a:off x="7945120" y="22140234"/>
+            <a:ext cx="5783480" cy="5768037"/>
           </a:xfrm>
           <a:prstGeom prst="rect">
             <a:avLst/>
@@ -6942,7 +6972,7 @@
 </file>
 
 <file path=ppt/slides/slide2.xml><?xml version="1.0" encoding="utf-8"?>
-<p:sld xmlns:a="http://schemas.openxmlformats.org/drawingml/2006/main" xmlns:r="http://schemas.openxmlformats.org/officeDocument/2006/relationships" xmlns:p="http://schemas.openxmlformats.org/presentationml/2006/main">
+<p:sld xmlns:a="http://schemas.openxmlformats.org/drawingml/2006/main" xmlns:r="http://schemas.openxmlformats.org/officeDocument/2006/relationships" xmlns:p="http://schemas.openxmlformats.org/presentationml/2006/main" show="0">
   <p:cSld>
     <p:spTree>
       <p:nvGrpSpPr>

</xml_diff>

<commit_message>
Minor fixes to poster
</commit_message>
<xml_diff>
--- a/Documents/G7-a0_landscape-projectposter-Daniel.pptx
+++ b/Documents/G7-a0_landscape-projectposter-Daniel.pptx
@@ -3613,7 +3613,7 @@
                 <a:latin typeface="Times New Roman" panose="02020603050405020304" pitchFamily="18" charset="0"/>
                 <a:cs typeface="Times New Roman" panose="02020603050405020304" pitchFamily="18" charset="0"/>
               </a:rPr>
-              <a:t>Eliminate need for overprovisioning</a:t>
+              <a:t>Eliminate manual labour</a:t>
             </a:r>
           </a:p>
         </p:txBody>
@@ -6432,7 +6432,7 @@
                 <a:latin typeface="Times New Roman" panose="02020603050405020304" pitchFamily="18" charset="0"/>
                 <a:cs typeface="Times New Roman" panose="02020603050405020304" pitchFamily="18" charset="0"/>
               </a:rPr>
-              <a:t>Testing</a:t>
+              <a:t>Testing and Validation</a:t>
             </a:r>
           </a:p>
           <a:p>
@@ -6469,6 +6469,24 @@
                 <a:cs typeface="Times New Roman" panose="02020603050405020304" pitchFamily="18" charset="0"/>
               </a:rPr>
               <a:t>Historical data collection</a:t>
+            </a:r>
+          </a:p>
+          <a:p>
+            <a:pPr marL="685800" indent="-457200">
+              <a:spcBef>
+                <a:spcPts val="1417"/>
+              </a:spcBef>
+              <a:defRPr/>
+            </a:pPr>
+            <a:r>
+              <a:rPr lang="en-GB" sz="2400" spc="-1" dirty="0">
+                <a:solidFill>
+                  <a:srgbClr val="000000"/>
+                </a:solidFill>
+                <a:latin typeface="Times New Roman" panose="02020603050405020304" pitchFamily="18" charset="0"/>
+                <a:cs typeface="Times New Roman" panose="02020603050405020304" pitchFamily="18" charset="0"/>
+              </a:rPr>
+              <a:t>Anomaly detection model training</a:t>
             </a:r>
           </a:p>
         </p:txBody>
@@ -6488,7 +6506,7 @@
         <p:spPr>
           <a:xfrm>
             <a:off x="29029680" y="22003200"/>
-            <a:ext cx="12273120" cy="5622052"/>
+            <a:ext cx="12273120" cy="5073184"/>
           </a:xfrm>
           <a:prstGeom prst="rect">
             <a:avLst/>
@@ -6579,9 +6597,103 @@
             </a:r>
           </a:p>
           <a:p>
+            <a:pPr marL="342900" marR="0" lvl="0" indent="-342900" algn="l" defTabSz="914400" rtl="0" eaLnBrk="1" fontAlgn="auto" latinLnBrk="0" hangingPunct="1">
+              <a:lnSpc>
+                <a:spcPct val="100000"/>
+              </a:lnSpc>
+              <a:spcBef>
+                <a:spcPts val="1417"/>
+              </a:spcBef>
+              <a:spcAft>
+                <a:spcPts val="0"/>
+              </a:spcAft>
+              <a:buClrTx/>
+              <a:buSzTx/>
+              <a:buFont typeface="Arial" panose="020B0604020202020204" pitchFamily="34" charset="0"/>
+              <a:buChar char="•"/>
+              <a:tabLst/>
+              <a:defRPr/>
+            </a:pPr>
+            <a:r>
+              <a:rPr lang="en-GB" sz="2400" spc="-1" dirty="0">
+                <a:solidFill>
+                  <a:srgbClr val="000000"/>
+                </a:solidFill>
+                <a:latin typeface="Times New Roman" panose="02020603050405020304" pitchFamily="18" charset="0"/>
+                <a:cs typeface="Times New Roman" panose="02020603050405020304" pitchFamily="18" charset="0"/>
+              </a:rPr>
+              <a:t>Dynamic adaptation optimizes performance under fluctuating traffic loads</a:t>
+            </a:r>
+          </a:p>
+          <a:p>
+            <a:pPr marL="342900" marR="0" lvl="0" indent="-342900" algn="l" defTabSz="914400" rtl="0" eaLnBrk="1" fontAlgn="auto" latinLnBrk="0" hangingPunct="1">
+              <a:lnSpc>
+                <a:spcPct val="100000"/>
+              </a:lnSpc>
+              <a:spcBef>
+                <a:spcPts val="1417"/>
+              </a:spcBef>
+              <a:spcAft>
+                <a:spcPts val="0"/>
+              </a:spcAft>
+              <a:buClrTx/>
+              <a:buSzTx/>
+              <a:buFont typeface="Arial" panose="020B0604020202020204" pitchFamily="34" charset="0"/>
+              <a:buChar char="•"/>
+              <a:tabLst/>
+              <a:defRPr/>
+            </a:pPr>
+            <a:r>
+              <a:rPr lang="en-GB" sz="2400" spc="-1" dirty="0">
+                <a:solidFill>
+                  <a:srgbClr val="000000"/>
+                </a:solidFill>
+                <a:latin typeface="Times New Roman" panose="02020603050405020304" pitchFamily="18" charset="0"/>
+                <a:cs typeface="Times New Roman" panose="02020603050405020304" pitchFamily="18" charset="0"/>
+              </a:rPr>
+              <a:t>Automatic reboot mechanisms ensure minimal downtime and uninterrupted hosting</a:t>
+            </a:r>
+            <a:endParaRPr lang="en-US" sz="2400" spc="-1" dirty="0">
+              <a:solidFill>
+                <a:srgbClr val="000000"/>
+              </a:solidFill>
+              <a:latin typeface="Times New Roman" panose="02020603050405020304" pitchFamily="18" charset="0"/>
+              <a:cs typeface="Times New Roman" panose="02020603050405020304" pitchFamily="18" charset="0"/>
+            </a:endParaRPr>
+          </a:p>
+          <a:p>
+            <a:pPr marL="342900" marR="0" lvl="0" indent="-342900" algn="l" defTabSz="914400" rtl="0" eaLnBrk="1" fontAlgn="auto" latinLnBrk="0" hangingPunct="1">
+              <a:lnSpc>
+                <a:spcPct val="100000"/>
+              </a:lnSpc>
+              <a:spcBef>
+                <a:spcPts val="1417"/>
+              </a:spcBef>
+              <a:spcAft>
+                <a:spcPts val="0"/>
+              </a:spcAft>
+              <a:buClrTx/>
+              <a:buSzTx/>
+              <a:buFont typeface="Arial" panose="020B0604020202020204" pitchFamily="34" charset="0"/>
+              <a:buChar char="•"/>
+              <a:tabLst/>
+              <a:defRPr/>
+            </a:pPr>
+            <a:r>
+              <a:rPr lang="en-US" sz="2400" spc="-1" dirty="0">
+                <a:solidFill>
+                  <a:srgbClr val="000000"/>
+                </a:solidFill>
+                <a:latin typeface="Times New Roman" panose="02020603050405020304" pitchFamily="18" charset="0"/>
+                <a:cs typeface="Times New Roman" panose="02020603050405020304" pitchFamily="18" charset="0"/>
+              </a:rPr>
+              <a:t>Optimal thresholds reduce content oscillation and enable efficient resource allocation</a:t>
+            </a:r>
+          </a:p>
+          <a:p>
             <a:pPr marL="0" marR="0" lvl="0" indent="0" algn="l" defTabSz="914400" rtl="0" eaLnBrk="1" fontAlgn="auto" latinLnBrk="0" hangingPunct="1">
               <a:lnSpc>
-                <a:spcPct val="100000"/>
+                <a:spcPct val="150000"/>
               </a:lnSpc>
               <a:spcBef>
                 <a:spcPts val="1417"/>
@@ -6596,58 +6708,6 @@
               <a:tabLst/>
               <a:defRPr/>
             </a:pPr>
-            <a:endParaRPr lang="en-US" sz="3200" b="1" dirty="0">
-              <a:solidFill>
-                <a:srgbClr val="000000"/>
-              </a:solidFill>
-              <a:latin typeface="Times New Roman" panose="02020603050405020304" pitchFamily="18" charset="0"/>
-              <a:cs typeface="Times New Roman" panose="02020603050405020304" pitchFamily="18" charset="0"/>
-            </a:endParaRPr>
-          </a:p>
-          <a:p>
-            <a:pPr marL="0" marR="0" lvl="0" indent="0" algn="l" defTabSz="914400" rtl="0" eaLnBrk="1" fontAlgn="auto" latinLnBrk="0" hangingPunct="1">
-              <a:lnSpc>
-                <a:spcPct val="100000"/>
-              </a:lnSpc>
-              <a:spcBef>
-                <a:spcPts val="1417"/>
-              </a:spcBef>
-              <a:spcAft>
-                <a:spcPts val="0"/>
-              </a:spcAft>
-              <a:buClrTx/>
-              <a:buSzTx/>
-              <a:buFont typeface="Arial" panose="020B0604020202020204" pitchFamily="34" charset="0"/>
-              <a:buNone/>
-              <a:tabLst/>
-              <a:defRPr/>
-            </a:pPr>
-            <a:endParaRPr lang="en-US" sz="3200" b="1" dirty="0">
-              <a:solidFill>
-                <a:srgbClr val="000000"/>
-              </a:solidFill>
-              <a:latin typeface="Times New Roman" panose="02020603050405020304" pitchFamily="18" charset="0"/>
-              <a:cs typeface="Times New Roman" panose="02020603050405020304" pitchFamily="18" charset="0"/>
-            </a:endParaRPr>
-          </a:p>
-          <a:p>
-            <a:pPr marL="0" marR="0" lvl="0" indent="0" algn="l" defTabSz="914400" rtl="0" eaLnBrk="1" fontAlgn="auto" latinLnBrk="0" hangingPunct="1">
-              <a:lnSpc>
-                <a:spcPct val="100000"/>
-              </a:lnSpc>
-              <a:spcBef>
-                <a:spcPts val="1417"/>
-              </a:spcBef>
-              <a:spcAft>
-                <a:spcPts val="0"/>
-              </a:spcAft>
-              <a:buClrTx/>
-              <a:buSzTx/>
-              <a:buFont typeface="Arial" panose="020B0604020202020204" pitchFamily="34" charset="0"/>
-              <a:buNone/>
-              <a:tabLst/>
-              <a:defRPr/>
-            </a:pPr>
             <a:r>
               <a:rPr lang="en-US" sz="3200" b="1" dirty="0">
                 <a:solidFill>
@@ -6716,49 +6776,6 @@
               </a:rPr>
               <a:t>Framework scalability to even more resource constrained environments</a:t>
             </a:r>
-          </a:p>
-          <a:p>
-            <a:pPr marR="0" lvl="0" algn="l" defTabSz="914400" rtl="0" eaLnBrk="1" fontAlgn="auto" latinLnBrk="0" hangingPunct="1">
-              <a:lnSpc>
-                <a:spcPct val="100000"/>
-              </a:lnSpc>
-              <a:spcBef>
-                <a:spcPts val="1417"/>
-              </a:spcBef>
-              <a:spcAft>
-                <a:spcPts val="0"/>
-              </a:spcAft>
-              <a:buClrTx/>
-              <a:buSzTx/>
-              <a:tabLst/>
-              <a:defRPr/>
-            </a:pPr>
-            <a:endParaRPr lang="en-US" sz="2400" spc="-1" dirty="0">
-              <a:solidFill>
-                <a:srgbClr val="000000"/>
-              </a:solidFill>
-              <a:latin typeface="Times New Roman" panose="02020603050405020304" pitchFamily="18" charset="0"/>
-              <a:cs typeface="Times New Roman" panose="02020603050405020304" pitchFamily="18" charset="0"/>
-            </a:endParaRPr>
-          </a:p>
-          <a:p>
-            <a:pPr marL="342900" marR="0" lvl="0" indent="-342900" algn="l" defTabSz="914400" rtl="0" eaLnBrk="1" fontAlgn="auto" latinLnBrk="0" hangingPunct="1">
-              <a:lnSpc>
-                <a:spcPct val="100000"/>
-              </a:lnSpc>
-              <a:spcBef>
-                <a:spcPts val="1417"/>
-              </a:spcBef>
-              <a:spcAft>
-                <a:spcPts val="0"/>
-              </a:spcAft>
-              <a:buClrTx/>
-              <a:buSzTx/>
-              <a:buFont typeface="Arial" panose="020B0604020202020204" pitchFamily="34" charset="0"/>
-              <a:buChar char="•"/>
-              <a:tabLst/>
-              <a:defRPr/>
-            </a:pPr>
             <a:endParaRPr kumimoji="0" lang="en-GB" sz="2400" i="0" u="none" strike="noStrike" kern="1200" cap="none" spc="-1" normalizeH="0" baseline="0" noProof="0" dirty="0">
               <a:ln>
                 <a:noFill/>
@@ -6925,7 +6942,7 @@
         </p:blipFill>
         <p:spPr>
           <a:xfrm>
-            <a:off x="1455480" y="22898976"/>
+            <a:off x="1455480" y="23062497"/>
             <a:ext cx="6323627" cy="4250552"/>
           </a:xfrm>
           <a:prstGeom prst="rect">
@@ -6955,7 +6972,7 @@
         </p:blipFill>
         <p:spPr>
           <a:xfrm>
-            <a:off x="7945120" y="22140234"/>
+            <a:off x="7945120" y="22419396"/>
             <a:ext cx="5783480" cy="5768037"/>
           </a:xfrm>
           <a:prstGeom prst="rect">

</xml_diff>